<commit_message>
update del ppt del dia 2
</commit_message>
<xml_diff>
--- a/FullStak Dia 2.pptx
+++ b/FullStak Dia 2.pptx
@@ -14,7 +14,12 @@
     <p:sldId id="264" r:id="rId8"/>
     <p:sldId id="265" r:id="rId9"/>
     <p:sldId id="260" r:id="rId10"/>
-    <p:sldId id="259" r:id="rId11"/>
+    <p:sldId id="266" r:id="rId11"/>
+    <p:sldId id="267" r:id="rId12"/>
+    <p:sldId id="259" r:id="rId13"/>
+    <p:sldId id="268" r:id="rId14"/>
+    <p:sldId id="269" r:id="rId15"/>
+    <p:sldId id="270" r:id="rId16"/>
   </p:sldIdLst>
   <p:sldSz cx="9144000" cy="6858000" type="screen4x3"/>
   <p:notesSz cx="6858000" cy="9144000"/>
@@ -14706,24 +14711,461 @@
         </p:nvSpPr>
         <p:spPr/>
         <p:txBody>
+          <a:bodyPr>
+            <a:normAutofit fontScale="85000" lnSpcReduction="20000"/>
+          </a:bodyPr>
+          <a:lstStyle/>
+          <a:p>
+            <a:r>
+              <a:rPr lang="es-AR" dirty="0"/>
+              <a:t>https://angular.io/guide/router</a:t>
+            </a:r>
+          </a:p>
+          <a:p>
+            <a:r>
+              <a:rPr lang="es-AR" dirty="0" err="1" smtClean="0"/>
+              <a:t>import</a:t>
+            </a:r>
+            <a:r>
+              <a:rPr lang="es-AR" dirty="0" smtClean="0"/>
+              <a:t> </a:t>
+            </a:r>
+            <a:r>
+              <a:rPr lang="es-AR" dirty="0"/>
+              <a:t>{ </a:t>
+            </a:r>
+            <a:r>
+              <a:rPr lang="es-AR" dirty="0" err="1">
+                <a:hlinkClick r:id="rId2"/>
+              </a:rPr>
+              <a:t>FormsModule</a:t>
+            </a:r>
+            <a:r>
+              <a:rPr lang="es-AR" dirty="0"/>
+              <a:t> } </a:t>
+            </a:r>
+            <a:r>
+              <a:rPr lang="es-AR" dirty="0" err="1"/>
+              <a:t>from</a:t>
+            </a:r>
+            <a:r>
+              <a:rPr lang="es-AR" dirty="0"/>
+              <a:t> '@angular/</a:t>
+            </a:r>
+            <a:r>
+              <a:rPr lang="es-AR" dirty="0" err="1"/>
+              <a:t>forms</a:t>
+            </a:r>
+            <a:r>
+              <a:rPr lang="es-AR" dirty="0"/>
+              <a:t>'; </a:t>
+            </a:r>
+            <a:r>
+              <a:rPr lang="es-AR" dirty="0" err="1"/>
+              <a:t>import</a:t>
+            </a:r>
+            <a:r>
+              <a:rPr lang="es-AR" dirty="0"/>
+              <a:t> { </a:t>
+            </a:r>
+            <a:r>
+              <a:rPr lang="es-AR" dirty="0" err="1">
+                <a:hlinkClick r:id="rId3"/>
+              </a:rPr>
+              <a:t>RouterModule</a:t>
+            </a:r>
+            <a:r>
+              <a:rPr lang="es-AR" dirty="0"/>
+              <a:t>, </a:t>
+            </a:r>
+            <a:r>
+              <a:rPr lang="es-AR" dirty="0" err="1">
+                <a:hlinkClick r:id="rId4"/>
+              </a:rPr>
+              <a:t>Routes</a:t>
+            </a:r>
+            <a:r>
+              <a:rPr lang="es-AR" dirty="0"/>
+              <a:t> } </a:t>
+            </a:r>
+            <a:r>
+              <a:rPr lang="es-AR" dirty="0" err="1"/>
+              <a:t>from</a:t>
+            </a:r>
+            <a:r>
+              <a:rPr lang="es-AR" dirty="0"/>
+              <a:t> '@angular/</a:t>
+            </a:r>
+            <a:r>
+              <a:rPr lang="es-AR" dirty="0" err="1"/>
+              <a:t>router</a:t>
+            </a:r>
+            <a:r>
+              <a:rPr lang="es-AR" dirty="0" smtClean="0"/>
+              <a:t>';</a:t>
+            </a:r>
+          </a:p>
+          <a:p>
+            <a:r>
+              <a:rPr lang="es-AR" dirty="0" err="1"/>
+              <a:t>const</a:t>
+            </a:r>
+            <a:r>
+              <a:rPr lang="es-AR" dirty="0"/>
+              <a:t> </a:t>
+            </a:r>
+            <a:r>
+              <a:rPr lang="es-AR" dirty="0" err="1"/>
+              <a:t>appRoutes</a:t>
+            </a:r>
+            <a:r>
+              <a:rPr lang="es-AR" dirty="0"/>
+              <a:t>: </a:t>
+            </a:r>
+            <a:r>
+              <a:rPr lang="es-AR" dirty="0" err="1">
+                <a:hlinkClick r:id="rId4"/>
+              </a:rPr>
+              <a:t>Routes</a:t>
+            </a:r>
+            <a:r>
+              <a:rPr lang="es-AR" dirty="0"/>
+              <a:t> = [ { </a:t>
+            </a:r>
+            <a:r>
+              <a:rPr lang="es-AR" dirty="0" err="1"/>
+              <a:t>path</a:t>
+            </a:r>
+            <a:r>
+              <a:rPr lang="es-AR" dirty="0"/>
+              <a:t>: 'crisis-center', </a:t>
+            </a:r>
+            <a:r>
+              <a:rPr lang="es-AR" dirty="0" err="1"/>
+              <a:t>component</a:t>
+            </a:r>
+            <a:r>
+              <a:rPr lang="es-AR" dirty="0"/>
+              <a:t>: </a:t>
+            </a:r>
+            <a:r>
+              <a:rPr lang="es-AR" dirty="0" err="1"/>
+              <a:t>CrisisListComponent</a:t>
+            </a:r>
+            <a:r>
+              <a:rPr lang="es-AR" dirty="0"/>
+              <a:t> }, { </a:t>
+            </a:r>
+            <a:r>
+              <a:rPr lang="es-AR" dirty="0" err="1"/>
+              <a:t>path</a:t>
+            </a:r>
+            <a:r>
+              <a:rPr lang="es-AR" dirty="0"/>
+              <a:t>: '</a:t>
+            </a:r>
+            <a:r>
+              <a:rPr lang="es-AR" dirty="0" err="1"/>
+              <a:t>heroes</a:t>
+            </a:r>
+            <a:r>
+              <a:rPr lang="es-AR" dirty="0"/>
+              <a:t>', </a:t>
+            </a:r>
+            <a:r>
+              <a:rPr lang="es-AR" dirty="0" err="1"/>
+              <a:t>component</a:t>
+            </a:r>
+            <a:r>
+              <a:rPr lang="es-AR" dirty="0"/>
+              <a:t>: </a:t>
+            </a:r>
+            <a:r>
+              <a:rPr lang="es-AR" dirty="0" err="1"/>
+              <a:t>HeroListComponent</a:t>
+            </a:r>
+            <a:r>
+              <a:rPr lang="es-AR" dirty="0"/>
+              <a:t> }, </a:t>
+            </a:r>
+            <a:r>
+              <a:rPr lang="es-AR" dirty="0" smtClean="0"/>
+              <a:t>];</a:t>
+            </a:r>
+          </a:p>
+          <a:p>
+            <a:endParaRPr lang="es-AR" dirty="0"/>
+          </a:p>
+          <a:p>
+            <a:r>
+              <a:rPr lang="es-AR" dirty="0"/>
+              <a:t>@</a:t>
+            </a:r>
+            <a:r>
+              <a:rPr lang="es-AR" dirty="0" err="1">
+                <a:hlinkClick r:id="rId5"/>
+              </a:rPr>
+              <a:t>NgModule</a:t>
+            </a:r>
+            <a:r>
+              <a:rPr lang="es-AR" dirty="0"/>
+              <a:t>({ </a:t>
+            </a:r>
+            <a:r>
+              <a:rPr lang="es-AR" dirty="0" err="1">
+                <a:hlinkClick r:id="rId6"/>
+              </a:rPr>
+              <a:t>imports</a:t>
+            </a:r>
+            <a:r>
+              <a:rPr lang="es-AR" dirty="0"/>
+              <a:t>: [ </a:t>
+            </a:r>
+            <a:r>
+              <a:rPr lang="es-AR" dirty="0" err="1">
+                <a:hlinkClick r:id="rId7"/>
+              </a:rPr>
+              <a:t>BrowserModule</a:t>
+            </a:r>
+            <a:r>
+              <a:rPr lang="es-AR" dirty="0"/>
+              <a:t>, </a:t>
+            </a:r>
+            <a:r>
+              <a:rPr lang="es-AR" dirty="0" err="1">
+                <a:hlinkClick r:id="rId2"/>
+              </a:rPr>
+              <a:t>FormsModule</a:t>
+            </a:r>
+            <a:r>
+              <a:rPr lang="es-AR" dirty="0"/>
+              <a:t>, </a:t>
+            </a:r>
+            <a:r>
+              <a:rPr lang="es-AR" dirty="0" err="1"/>
+              <a:t>RouterModule.forRoot</a:t>
+            </a:r>
+            <a:r>
+              <a:rPr lang="es-AR" dirty="0"/>
+              <a:t>( </a:t>
+            </a:r>
+            <a:r>
+              <a:rPr lang="es-AR" dirty="0" err="1"/>
+              <a:t>appRoutes</a:t>
+            </a:r>
+            <a:r>
+              <a:rPr lang="es-AR" dirty="0"/>
+              <a:t>, { </a:t>
+            </a:r>
+            <a:r>
+              <a:rPr lang="es-AR" dirty="0" err="1">
+                <a:hlinkClick r:id="rId8"/>
+              </a:rPr>
+              <a:t>enableTracing</a:t>
+            </a:r>
+            <a:r>
+              <a:rPr lang="es-AR" dirty="0"/>
+              <a:t>: true } // &lt;-- </a:t>
+            </a:r>
+            <a:r>
+              <a:rPr lang="es-AR" dirty="0" err="1"/>
+              <a:t>debugging</a:t>
+            </a:r>
+            <a:r>
+              <a:rPr lang="es-AR" dirty="0"/>
+              <a:t> </a:t>
+            </a:r>
+            <a:r>
+              <a:rPr lang="es-AR" dirty="0" err="1"/>
+              <a:t>purposes</a:t>
+            </a:r>
+            <a:r>
+              <a:rPr lang="es-AR" dirty="0"/>
+              <a:t> </a:t>
+            </a:r>
+            <a:r>
+              <a:rPr lang="es-AR" dirty="0" err="1"/>
+              <a:t>only</a:t>
+            </a:r>
+            <a:r>
+              <a:rPr lang="es-AR" dirty="0"/>
+              <a:t> ) ], </a:t>
+            </a:r>
+            <a:r>
+              <a:rPr lang="es-AR" dirty="0" err="1">
+                <a:hlinkClick r:id="rId9"/>
+              </a:rPr>
+              <a:t>declarations</a:t>
+            </a:r>
+            <a:r>
+              <a:rPr lang="es-AR" dirty="0"/>
+              <a:t>: </a:t>
+            </a:r>
+            <a:r>
+              <a:rPr lang="es-AR" dirty="0" smtClean="0"/>
+              <a:t>[</a:t>
+            </a:r>
+          </a:p>
+          <a:p>
+            <a:endParaRPr lang="es-AR" dirty="0"/>
+          </a:p>
+          <a:p>
+            <a:r>
+              <a:rPr lang="es-AR" dirty="0"/>
+              <a:t>&lt;</a:t>
+            </a:r>
+            <a:r>
+              <a:rPr lang="es-AR" dirty="0" err="1">
+                <a:hlinkClick r:id="rId10"/>
+              </a:rPr>
+              <a:t>router-outlet</a:t>
+            </a:r>
+            <a:r>
+              <a:rPr lang="es-AR" dirty="0"/>
+              <a:t>&gt;&lt;/</a:t>
+            </a:r>
+            <a:r>
+              <a:rPr lang="es-AR" dirty="0" err="1">
+                <a:hlinkClick r:id="rId10"/>
+              </a:rPr>
+              <a:t>router-outlet</a:t>
+            </a:r>
+            <a:r>
+              <a:rPr lang="es-AR" dirty="0" smtClean="0"/>
+              <a:t>&gt;   En el </a:t>
+            </a:r>
+            <a:r>
+              <a:rPr lang="es-AR" dirty="0" err="1" smtClean="0"/>
+              <a:t>app</a:t>
+            </a:r>
+            <a:r>
+              <a:rPr lang="es-AR" dirty="0" smtClean="0"/>
+              <a:t> </a:t>
+            </a:r>
+            <a:r>
+              <a:rPr lang="es-AR" dirty="0" err="1" smtClean="0"/>
+              <a:t>Component</a:t>
+            </a:r>
+            <a:r>
+              <a:rPr lang="es-AR" dirty="0" smtClean="0"/>
+              <a:t> </a:t>
+            </a:r>
+          </a:p>
+          <a:p>
+            <a:endParaRPr lang="es-AR" dirty="0"/>
+          </a:p>
+        </p:txBody>
+      </p:sp>
+      <p:sp>
+        <p:nvSpPr>
+          <p:cNvPr id="3" name="Title 2"/>
+          <p:cNvSpPr>
+            <a:spLocks noGrp="1"/>
+          </p:cNvSpPr>
+          <p:nvPr>
+            <p:ph type="title"/>
+          </p:nvPr>
+        </p:nvSpPr>
+        <p:spPr/>
+        <p:txBody>
+          <a:bodyPr>
+            <a:normAutofit fontScale="90000"/>
+          </a:bodyPr>
+          <a:lstStyle/>
+          <a:p>
+            <a:r>
+              <a:rPr lang="es-AR" dirty="0" err="1" smtClean="0"/>
+              <a:t>Routing</a:t>
+            </a:r>
+            <a:r>
+              <a:rPr lang="es-AR" dirty="0" smtClean="0"/>
+              <a:t> </a:t>
+            </a:r>
+            <a:r>
+              <a:rPr lang="es-AR" dirty="0" err="1" smtClean="0"/>
+              <a:t>Navegation</a:t>
+            </a:r>
+            <a:r>
+              <a:rPr lang="es-AR" dirty="0" smtClean="0"/>
+              <a:t> + </a:t>
+            </a:r>
+            <a:r>
+              <a:rPr lang="es-AR" dirty="0" err="1" smtClean="0"/>
+              <a:t>formModule</a:t>
+            </a:r>
+            <a:endParaRPr lang="es-AR" dirty="0"/>
+          </a:p>
+        </p:txBody>
+      </p:sp>
+    </p:spTree>
+    <p:extLst>
+      <p:ext uri="{BB962C8B-B14F-4D97-AF65-F5344CB8AC3E}">
+        <p14:creationId xmlns:p14="http://schemas.microsoft.com/office/powerpoint/2010/main" val="1067581565"/>
+      </p:ext>
+    </p:extLst>
+  </p:cSld>
+  <p:clrMapOvr>
+    <a:masterClrMapping/>
+  </p:clrMapOvr>
+</p:sld>
+</file>
+
+<file path=ppt/slides/slide11.xml><?xml version="1.0" encoding="utf-8"?>
+<p:sld xmlns:a="http://schemas.openxmlformats.org/drawingml/2006/main" xmlns:r="http://schemas.openxmlformats.org/officeDocument/2006/relationships" xmlns:p="http://schemas.openxmlformats.org/presentationml/2006/main">
+  <p:cSld>
+    <p:spTree>
+      <p:nvGrpSpPr>
+        <p:cNvPr id="1" name=""/>
+        <p:cNvGrpSpPr/>
+        <p:nvPr/>
+      </p:nvGrpSpPr>
+      <p:grpSpPr>
+        <a:xfrm>
+          <a:off x="0" y="0"/>
+          <a:ext cx="0" cy="0"/>
+          <a:chOff x="0" y="0"/>
+          <a:chExt cx="0" cy="0"/>
+        </a:xfrm>
+      </p:grpSpPr>
+      <p:sp>
+        <p:nvSpPr>
+          <p:cNvPr id="2" name="Content Placeholder 1"/>
+          <p:cNvSpPr>
+            <a:spLocks noGrp="1"/>
+          </p:cNvSpPr>
+          <p:nvPr>
+            <p:ph idx="1"/>
+          </p:nvPr>
+        </p:nvSpPr>
+        <p:spPr/>
+        <p:txBody>
           <a:bodyPr/>
           <a:lstStyle/>
           <a:p>
             <a:r>
-              <a:rPr lang="es-AR" dirty="0">
-                <a:hlinkClick r:id="rId2"/>
-              </a:rPr>
-              <a:t>https://vmware.github.io/clarity</a:t>
-            </a:r>
-            <a:r>
-              <a:rPr lang="es-AR" dirty="0" smtClean="0">
-                <a:hlinkClick r:id="rId2"/>
-              </a:rPr>
-              <a:t>/</a:t>
-            </a:r>
-            <a:endParaRPr lang="es-AR" dirty="0" smtClean="0"/>
-          </a:p>
-          <a:p>
+              <a:rPr lang="es-AR" dirty="0" smtClean="0"/>
+              <a:t>Mantiene toda la configuración  de una funcionalidad general o de toda la aplicación</a:t>
+            </a:r>
+          </a:p>
+          <a:p>
+            <a:r>
+              <a:rPr lang="es-AR" dirty="0" smtClean="0"/>
+              <a:t>Se puede </a:t>
+            </a:r>
+            <a:r>
+              <a:rPr lang="es-AR" dirty="0" err="1" smtClean="0"/>
+              <a:t>componentizar</a:t>
+            </a:r>
+            <a:r>
+              <a:rPr lang="es-AR" dirty="0" smtClean="0"/>
+              <a:t> funcionalidades con un modulo en particular, inyectado en el modulo principal</a:t>
+            </a:r>
+          </a:p>
+          <a:p>
+            <a:r>
+              <a:rPr lang="es-AR" smtClean="0"/>
+              <a:t>Ver ejemplos</a:t>
+            </a:r>
             <a:endParaRPr lang="es-AR" dirty="0"/>
           </a:p>
         </p:txBody>
@@ -14744,6 +15186,93 @@
           <a:lstStyle/>
           <a:p>
             <a:r>
+              <a:rPr lang="es-AR" dirty="0" smtClean="0"/>
+              <a:t>Entonces que hace el Modulo?</a:t>
+            </a:r>
+            <a:endParaRPr lang="es-AR" dirty="0"/>
+          </a:p>
+        </p:txBody>
+      </p:sp>
+    </p:spTree>
+    <p:extLst>
+      <p:ext uri="{BB962C8B-B14F-4D97-AF65-F5344CB8AC3E}">
+        <p14:creationId xmlns:p14="http://schemas.microsoft.com/office/powerpoint/2010/main" val="3421520124"/>
+      </p:ext>
+    </p:extLst>
+  </p:cSld>
+  <p:clrMapOvr>
+    <a:masterClrMapping/>
+  </p:clrMapOvr>
+</p:sld>
+</file>
+
+<file path=ppt/slides/slide12.xml><?xml version="1.0" encoding="utf-8"?>
+<p:sld xmlns:a="http://schemas.openxmlformats.org/drawingml/2006/main" xmlns:r="http://schemas.openxmlformats.org/officeDocument/2006/relationships" xmlns:p="http://schemas.openxmlformats.org/presentationml/2006/main">
+  <p:cSld>
+    <p:spTree>
+      <p:nvGrpSpPr>
+        <p:cNvPr id="1" name=""/>
+        <p:cNvGrpSpPr/>
+        <p:nvPr/>
+      </p:nvGrpSpPr>
+      <p:grpSpPr>
+        <a:xfrm>
+          <a:off x="0" y="0"/>
+          <a:ext cx="0" cy="0"/>
+          <a:chOff x="0" y="0"/>
+          <a:chExt cx="0" cy="0"/>
+        </a:xfrm>
+      </p:grpSpPr>
+      <p:sp>
+        <p:nvSpPr>
+          <p:cNvPr id="2" name="Content Placeholder 1"/>
+          <p:cNvSpPr>
+            <a:spLocks noGrp="1"/>
+          </p:cNvSpPr>
+          <p:nvPr>
+            <p:ph idx="1"/>
+          </p:nvPr>
+        </p:nvSpPr>
+        <p:spPr/>
+        <p:txBody>
+          <a:bodyPr/>
+          <a:lstStyle/>
+          <a:p>
+            <a:r>
+              <a:rPr lang="es-AR" dirty="0">
+                <a:hlinkClick r:id="rId2"/>
+              </a:rPr>
+              <a:t>https://vmware.github.io/clarity</a:t>
+            </a:r>
+            <a:r>
+              <a:rPr lang="es-AR" dirty="0" smtClean="0">
+                <a:hlinkClick r:id="rId2"/>
+              </a:rPr>
+              <a:t>/</a:t>
+            </a:r>
+            <a:endParaRPr lang="es-AR" dirty="0" smtClean="0"/>
+          </a:p>
+          <a:p>
+            <a:endParaRPr lang="es-AR" dirty="0"/>
+          </a:p>
+        </p:txBody>
+      </p:sp>
+      <p:sp>
+        <p:nvSpPr>
+          <p:cNvPr id="3" name="Title 2"/>
+          <p:cNvSpPr>
+            <a:spLocks noGrp="1"/>
+          </p:cNvSpPr>
+          <p:nvPr>
+            <p:ph type="title"/>
+          </p:nvPr>
+        </p:nvSpPr>
+        <p:spPr/>
+        <p:txBody>
+          <a:bodyPr/>
+          <a:lstStyle/>
+          <a:p>
+            <a:r>
               <a:rPr lang="es-AR" dirty="0" err="1" smtClean="0"/>
               <a:t>Clarity</a:t>
             </a:r>
@@ -14755,6 +15284,340 @@
     <p:extLst>
       <p:ext uri="{BB962C8B-B14F-4D97-AF65-F5344CB8AC3E}">
         <p14:creationId xmlns:p14="http://schemas.microsoft.com/office/powerpoint/2010/main" val="415000754"/>
+      </p:ext>
+    </p:extLst>
+  </p:cSld>
+  <p:clrMapOvr>
+    <a:masterClrMapping/>
+  </p:clrMapOvr>
+</p:sld>
+</file>
+
+<file path=ppt/slides/slide13.xml><?xml version="1.0" encoding="utf-8"?>
+<p:sld xmlns:a="http://schemas.openxmlformats.org/drawingml/2006/main" xmlns:r="http://schemas.openxmlformats.org/officeDocument/2006/relationships" xmlns:p="http://schemas.openxmlformats.org/presentationml/2006/main">
+  <p:cSld>
+    <p:spTree>
+      <p:nvGrpSpPr>
+        <p:cNvPr id="1" name=""/>
+        <p:cNvGrpSpPr/>
+        <p:nvPr/>
+      </p:nvGrpSpPr>
+      <p:grpSpPr>
+        <a:xfrm>
+          <a:off x="0" y="0"/>
+          <a:ext cx="0" cy="0"/>
+          <a:chOff x="0" y="0"/>
+          <a:chExt cx="0" cy="0"/>
+        </a:xfrm>
+      </p:grpSpPr>
+      <p:sp>
+        <p:nvSpPr>
+          <p:cNvPr id="2" name="Content Placeholder 1"/>
+          <p:cNvSpPr>
+            <a:spLocks noGrp="1"/>
+          </p:cNvSpPr>
+          <p:nvPr>
+            <p:ph idx="1"/>
+          </p:nvPr>
+        </p:nvSpPr>
+        <p:spPr/>
+        <p:txBody>
+          <a:bodyPr/>
+          <a:lstStyle/>
+          <a:p>
+            <a:r>
+              <a:rPr lang="es-AR" dirty="0" smtClean="0"/>
+              <a:t>Que es esto?  Y para que sirven?</a:t>
+            </a:r>
+          </a:p>
+          <a:p>
+            <a:r>
+              <a:rPr lang="es-AR" dirty="0">
+                <a:hlinkClick r:id="rId2"/>
+              </a:rPr>
+              <a:t>https://</a:t>
+            </a:r>
+            <a:r>
+              <a:rPr lang="es-AR" dirty="0" smtClean="0">
+                <a:hlinkClick r:id="rId2"/>
+              </a:rPr>
+              <a:t>github.com/Modernizr/Modernizr/wiki/HTML5-Cross-Browser-Polyfills</a:t>
+            </a:r>
+            <a:endParaRPr lang="es-AR" dirty="0" smtClean="0"/>
+          </a:p>
+          <a:p>
+            <a:endParaRPr lang="es-AR" dirty="0"/>
+          </a:p>
+        </p:txBody>
+      </p:sp>
+      <p:sp>
+        <p:nvSpPr>
+          <p:cNvPr id="3" name="Title 2"/>
+          <p:cNvSpPr>
+            <a:spLocks noGrp="1"/>
+          </p:cNvSpPr>
+          <p:nvPr>
+            <p:ph type="title"/>
+          </p:nvPr>
+        </p:nvSpPr>
+        <p:spPr/>
+        <p:txBody>
+          <a:bodyPr/>
+          <a:lstStyle/>
+          <a:p>
+            <a:r>
+              <a:rPr lang="es-AR" dirty="0" err="1" smtClean="0"/>
+              <a:t>Polyfills</a:t>
+            </a:r>
+            <a:endParaRPr lang="es-AR" dirty="0"/>
+          </a:p>
+        </p:txBody>
+      </p:sp>
+    </p:spTree>
+    <p:extLst>
+      <p:ext uri="{BB962C8B-B14F-4D97-AF65-F5344CB8AC3E}">
+        <p14:creationId xmlns:p14="http://schemas.microsoft.com/office/powerpoint/2010/main" val="3921835389"/>
+      </p:ext>
+    </p:extLst>
+  </p:cSld>
+  <p:clrMapOvr>
+    <a:masterClrMapping/>
+  </p:clrMapOvr>
+</p:sld>
+</file>
+
+<file path=ppt/slides/slide14.xml><?xml version="1.0" encoding="utf-8"?>
+<p:sld xmlns:a="http://schemas.openxmlformats.org/drawingml/2006/main" xmlns:r="http://schemas.openxmlformats.org/officeDocument/2006/relationships" xmlns:p="http://schemas.openxmlformats.org/presentationml/2006/main">
+  <p:cSld>
+    <p:spTree>
+      <p:nvGrpSpPr>
+        <p:cNvPr id="1" name=""/>
+        <p:cNvGrpSpPr/>
+        <p:nvPr/>
+      </p:nvGrpSpPr>
+      <p:grpSpPr>
+        <a:xfrm>
+          <a:off x="0" y="0"/>
+          <a:ext cx="0" cy="0"/>
+          <a:chOff x="0" y="0"/>
+          <a:chExt cx="0" cy="0"/>
+        </a:xfrm>
+      </p:grpSpPr>
+      <p:sp>
+        <p:nvSpPr>
+          <p:cNvPr id="3" name="Title 2"/>
+          <p:cNvSpPr>
+            <a:spLocks noGrp="1"/>
+          </p:cNvSpPr>
+          <p:nvPr>
+            <p:ph type="title"/>
+          </p:nvPr>
+        </p:nvSpPr>
+        <p:spPr/>
+        <p:txBody>
+          <a:bodyPr/>
+          <a:lstStyle/>
+          <a:p>
+            <a:r>
+              <a:rPr lang="es-AR" dirty="0" smtClean="0"/>
+              <a:t>Dudas y consultas????</a:t>
+            </a:r>
+            <a:endParaRPr lang="es-AR" dirty="0"/>
+          </a:p>
+        </p:txBody>
+      </p:sp>
+      <p:pic>
+        <p:nvPicPr>
+          <p:cNvPr id="1026" name="Picture 2" descr="Image result for monkey doubt"/>
+          <p:cNvPicPr>
+            <a:picLocks noChangeAspect="1" noChangeArrowheads="1"/>
+          </p:cNvPicPr>
+          <p:nvPr/>
+        </p:nvPicPr>
+        <p:blipFill>
+          <a:blip r:embed="rId2">
+            <a:extLst>
+              <a:ext uri="{28A0092B-C50C-407E-A947-70E740481C1C}">
+                <a14:useLocalDpi xmlns:a14="http://schemas.microsoft.com/office/drawing/2010/main" val="0"/>
+              </a:ext>
+            </a:extLst>
+          </a:blip>
+          <a:srcRect/>
+          <a:stretch>
+            <a:fillRect/>
+          </a:stretch>
+        </p:blipFill>
+        <p:spPr bwMode="auto">
+          <a:xfrm>
+            <a:off x="3347864" y="2924944"/>
+            <a:ext cx="2457450" cy="3048001"/>
+          </a:xfrm>
+          <a:prstGeom prst="rect">
+            <a:avLst/>
+          </a:prstGeom>
+          <a:noFill/>
+          <a:extLst>
+            <a:ext uri="{909E8E84-426E-40DD-AFC4-6F175D3DCCD1}">
+              <a14:hiddenFill xmlns:a14="http://schemas.microsoft.com/office/drawing/2010/main">
+                <a:solidFill>
+                  <a:srgbClr val="FFFFFF"/>
+                </a:solidFill>
+              </a14:hiddenFill>
+            </a:ext>
+          </a:extLst>
+        </p:spPr>
+      </p:pic>
+    </p:spTree>
+    <p:extLst>
+      <p:ext uri="{BB962C8B-B14F-4D97-AF65-F5344CB8AC3E}">
+        <p14:creationId xmlns:p14="http://schemas.microsoft.com/office/powerpoint/2010/main" val="3088867108"/>
+      </p:ext>
+    </p:extLst>
+  </p:cSld>
+  <p:clrMapOvr>
+    <a:masterClrMapping/>
+  </p:clrMapOvr>
+</p:sld>
+</file>
+
+<file path=ppt/slides/slide15.xml><?xml version="1.0" encoding="utf-8"?>
+<p:sld xmlns:a="http://schemas.openxmlformats.org/drawingml/2006/main" xmlns:r="http://schemas.openxmlformats.org/officeDocument/2006/relationships" xmlns:p="http://schemas.openxmlformats.org/presentationml/2006/main">
+  <p:cSld>
+    <p:spTree>
+      <p:nvGrpSpPr>
+        <p:cNvPr id="1" name=""/>
+        <p:cNvGrpSpPr/>
+        <p:nvPr/>
+      </p:nvGrpSpPr>
+      <p:grpSpPr>
+        <a:xfrm>
+          <a:off x="0" y="0"/>
+          <a:ext cx="0" cy="0"/>
+          <a:chOff x="0" y="0"/>
+          <a:chExt cx="0" cy="0"/>
+        </a:xfrm>
+      </p:grpSpPr>
+      <p:sp>
+        <p:nvSpPr>
+          <p:cNvPr id="2" name="Content Placeholder 1"/>
+          <p:cNvSpPr>
+            <a:spLocks noGrp="1"/>
+          </p:cNvSpPr>
+          <p:nvPr>
+            <p:ph idx="1"/>
+          </p:nvPr>
+        </p:nvSpPr>
+        <p:spPr/>
+        <p:txBody>
+          <a:bodyPr/>
+          <a:lstStyle/>
+          <a:p>
+            <a:r>
+              <a:rPr lang="es-AR" dirty="0" smtClean="0">
+                <a:hlinkClick r:id="rId2"/>
+              </a:rPr>
+              <a:t>Panella.dante@gmail.com</a:t>
+            </a:r>
+            <a:endParaRPr lang="es-AR" dirty="0" smtClean="0"/>
+          </a:p>
+          <a:p>
+            <a:r>
+              <a:rPr lang="es-AR" dirty="0">
+                <a:hlinkClick r:id="rId3"/>
+              </a:rPr>
+              <a:t>https://</a:t>
+            </a:r>
+            <a:r>
+              <a:rPr lang="es-AR" dirty="0" smtClean="0">
+                <a:hlinkClick r:id="rId3"/>
+              </a:rPr>
+              <a:t>www.linkedin.com/in/dante-panella-b3346a19</a:t>
+            </a:r>
+            <a:endParaRPr lang="es-AR" dirty="0" smtClean="0"/>
+          </a:p>
+          <a:p>
+            <a:endParaRPr lang="es-AR" dirty="0" smtClean="0"/>
+          </a:p>
+          <a:p>
+            <a:endParaRPr lang="es-AR" dirty="0"/>
+          </a:p>
+          <a:p>
+            <a:r>
+              <a:rPr lang="es-AR" dirty="0" smtClean="0"/>
+              <a:t>A DISFRUTAR EL SABADO!</a:t>
+            </a:r>
+            <a:endParaRPr lang="es-AR" dirty="0"/>
+          </a:p>
+        </p:txBody>
+      </p:sp>
+      <p:sp>
+        <p:nvSpPr>
+          <p:cNvPr id="3" name="Title 2"/>
+          <p:cNvSpPr>
+            <a:spLocks noGrp="1"/>
+          </p:cNvSpPr>
+          <p:nvPr>
+            <p:ph type="title"/>
+          </p:nvPr>
+        </p:nvSpPr>
+        <p:spPr/>
+        <p:txBody>
+          <a:bodyPr/>
+          <a:lstStyle/>
+          <a:p>
+            <a:r>
+              <a:rPr lang="es-AR" dirty="0" smtClean="0"/>
+              <a:t>Gracias!!!!</a:t>
+            </a:r>
+            <a:endParaRPr lang="es-AR" dirty="0"/>
+          </a:p>
+        </p:txBody>
+      </p:sp>
+      <p:pic>
+        <p:nvPicPr>
+          <p:cNvPr id="1026" name="Picture 2" descr="Related image"/>
+          <p:cNvPicPr>
+            <a:picLocks noChangeAspect="1" noChangeArrowheads="1"/>
+          </p:cNvPicPr>
+          <p:nvPr/>
+        </p:nvPicPr>
+        <p:blipFill>
+          <a:blip r:embed="rId4">
+            <a:extLst>
+              <a:ext uri="{28A0092B-C50C-407E-A947-70E740481C1C}">
+                <a14:useLocalDpi xmlns:a14="http://schemas.microsoft.com/office/drawing/2010/main" val="0"/>
+              </a:ext>
+            </a:extLst>
+          </a:blip>
+          <a:srcRect/>
+          <a:stretch>
+            <a:fillRect/>
+          </a:stretch>
+        </p:blipFill>
+        <p:spPr bwMode="auto">
+          <a:xfrm>
+            <a:off x="4860032" y="4005064"/>
+            <a:ext cx="3888432" cy="2592288"/>
+          </a:xfrm>
+          <a:prstGeom prst="rect">
+            <a:avLst/>
+          </a:prstGeom>
+          <a:noFill/>
+          <a:extLst>
+            <a:ext uri="{909E8E84-426E-40DD-AFC4-6F175D3DCCD1}">
+              <a14:hiddenFill xmlns:a14="http://schemas.microsoft.com/office/drawing/2010/main">
+                <a:solidFill>
+                  <a:srgbClr val="FFFFFF"/>
+                </a:solidFill>
+              </a14:hiddenFill>
+            </a:ext>
+          </a:extLst>
+        </p:spPr>
+      </p:pic>
+    </p:spTree>
+    <p:extLst>
+      <p:ext uri="{BB962C8B-B14F-4D97-AF65-F5344CB8AC3E}">
+        <p14:creationId xmlns:p14="http://schemas.microsoft.com/office/powerpoint/2010/main" val="3578086156"/>
       </p:ext>
     </p:extLst>
   </p:cSld>
@@ -16445,11 +17308,7 @@
           <a:p>
             <a:r>
               <a:rPr lang="es-AR"/>
-              <a:t>https://www.npmjs.com/package</a:t>
-            </a:r>
-            <a:r>
-              <a:rPr lang="es-AR"/>
-              <a:t>/@</a:t>
+              <a:t>https://www.npmjs.com/package/@</a:t>
             </a:r>
             <a:r>
               <a:rPr lang="es-AR" smtClean="0"/>

</xml_diff>